<commit_message>
Update xds 136 again
</commit_message>
<xml_diff>
--- a/宣道詩/(宣道詩136)不住祈禱.pptx
+++ b/宣道詩/(宣道詩136)不住祈禱.pptx
@@ -3123,7 +3123,7 @@
               <a:buNone/>
             </a:pPr>
             <a:r>
-              <a:rPr lang="zh-TW" altLang="en-US" sz="5000" b="1" dirty="0">
+              <a:rPr lang="zh-TW" altLang="en-US" sz="4800" b="1" dirty="0">
                 <a:solidFill>
                   <a:srgbClr val="002060"/>
                 </a:solidFill>
@@ -3133,7 +3133,7 @@
               <a:t>不住祈禱 </a:t>
             </a:r>
             <a:r>
-              <a:rPr lang="zh-TW" altLang="en-US" sz="5000" b="1" dirty="0" smtClean="0">
+              <a:rPr lang="zh-TW" altLang="en-US" sz="4800" b="1" dirty="0" smtClean="0">
                 <a:solidFill>
                   <a:srgbClr val="002060"/>
                 </a:solidFill>
@@ -3143,7 +3143,7 @@
               <a:t> 因</a:t>
             </a:r>
             <a:r>
-              <a:rPr lang="zh-TW" altLang="en-US" sz="5000" b="1" dirty="0">
+              <a:rPr lang="zh-TW" altLang="en-US" sz="4800" b="1" dirty="0">
                 <a:solidFill>
                   <a:srgbClr val="002060"/>
                 </a:solidFill>
@@ -3158,7 +3158,7 @@
               <a:buNone/>
             </a:pPr>
             <a:r>
-              <a:rPr lang="zh-TW" altLang="en-US" sz="5000" b="1" dirty="0">
+              <a:rPr lang="zh-TW" altLang="en-US" sz="4800" b="1" dirty="0">
                 <a:solidFill>
                   <a:srgbClr val="002060"/>
                 </a:solidFill>
@@ -3168,7 +3168,7 @@
               <a:t>不住祈禱 </a:t>
             </a:r>
             <a:r>
-              <a:rPr lang="zh-TW" altLang="en-US" sz="5000" b="1" dirty="0" smtClean="0">
+              <a:rPr lang="zh-TW" altLang="en-US" sz="4800" b="1" dirty="0" smtClean="0">
                 <a:solidFill>
                   <a:srgbClr val="002060"/>
                 </a:solidFill>
@@ -3178,7 +3178,7 @@
               <a:t> 主</a:t>
             </a:r>
             <a:r>
-              <a:rPr lang="zh-TW" altLang="en-US" sz="5000" b="1" dirty="0">
+              <a:rPr lang="zh-TW" altLang="en-US" sz="4800" b="1" dirty="0">
                 <a:solidFill>
                   <a:srgbClr val="002060"/>
                 </a:solidFill>
@@ -3188,7 +3188,7 @@
               <a:t>全要</a:t>
             </a:r>
             <a:r>
-              <a:rPr lang="zh-TW" altLang="en-US" sz="5000" b="1" dirty="0" smtClean="0">
+              <a:rPr lang="zh-TW" altLang="en-US" sz="4800" b="1" dirty="0" smtClean="0">
                 <a:solidFill>
                   <a:srgbClr val="002060"/>
                 </a:solidFill>
@@ -3197,7 +3197,7 @@
               </a:rPr>
               <a:t>聽</a:t>
             </a:r>
-            <a:endParaRPr lang="en-US" altLang="zh-TW" sz="5000" b="1" dirty="0" smtClean="0">
+            <a:endParaRPr lang="en-US" altLang="zh-TW" sz="4800" b="1" dirty="0" smtClean="0">
               <a:solidFill>
                 <a:srgbClr val="002060"/>
               </a:solidFill>
@@ -3210,7 +3210,7 @@
               <a:buNone/>
             </a:pPr>
             <a:r>
-              <a:rPr lang="zh-TW" altLang="en-US" sz="5000" b="1" dirty="0" smtClean="0">
+              <a:rPr lang="zh-TW" altLang="en-US" sz="4800" b="1" dirty="0" smtClean="0">
                 <a:solidFill>
                   <a:srgbClr val="002060"/>
                 </a:solidFill>
@@ -3220,7 +3220,7 @@
               <a:t>真神</a:t>
             </a:r>
             <a:r>
-              <a:rPr lang="zh-TW" altLang="en-US" sz="5000" b="1" dirty="0">
+              <a:rPr lang="zh-TW" altLang="en-US" sz="4800" b="1" dirty="0">
                 <a:solidFill>
                   <a:srgbClr val="002060"/>
                 </a:solidFill>
@@ -3230,7 +3230,7 @@
               <a:t>已許 </a:t>
             </a:r>
             <a:r>
-              <a:rPr lang="zh-TW" altLang="en-US" sz="5000" b="1" dirty="0" smtClean="0">
+              <a:rPr lang="zh-TW" altLang="en-US" sz="4800" b="1" dirty="0" smtClean="0">
                 <a:solidFill>
                   <a:srgbClr val="002060"/>
                 </a:solidFill>
@@ -3240,7 +3240,7 @@
               <a:t> 決不</a:t>
             </a:r>
             <a:r>
-              <a:rPr lang="zh-TW" altLang="en-US" sz="5000" b="1" dirty="0">
+              <a:rPr lang="zh-TW" altLang="en-US" sz="4800" b="1" dirty="0">
                 <a:solidFill>
                   <a:srgbClr val="002060"/>
                 </a:solidFill>
@@ -3255,7 +3255,7 @@
               <a:buNone/>
             </a:pPr>
             <a:r>
-              <a:rPr lang="zh-TW" altLang="en-US" sz="5000" b="1" dirty="0">
+              <a:rPr lang="zh-TW" altLang="en-US" sz="4800" b="1" dirty="0">
                 <a:solidFill>
                   <a:srgbClr val="002060"/>
                 </a:solidFill>
@@ -3265,7 +3265,7 @@
               <a:t>不住祈禱 </a:t>
             </a:r>
             <a:r>
-              <a:rPr lang="zh-TW" altLang="en-US" sz="5000" b="1" dirty="0" smtClean="0">
+              <a:rPr lang="zh-TW" altLang="en-US" sz="4800" b="1" dirty="0" smtClean="0">
                 <a:solidFill>
                   <a:srgbClr val="002060"/>
                 </a:solidFill>
@@ -3275,7 +3275,7 @@
               <a:t> 主</a:t>
             </a:r>
             <a:r>
-              <a:rPr lang="zh-TW" altLang="en-US" sz="5000" b="1" dirty="0">
+              <a:rPr lang="zh-TW" altLang="en-US" sz="4800" b="1" dirty="0">
                 <a:solidFill>
                   <a:srgbClr val="002060"/>
                 </a:solidFill>
@@ -3284,6 +3284,44 @@
               </a:rPr>
               <a:t>必應允</a:t>
             </a:r>
+          </a:p>
+        </p:txBody>
+      </p:sp>
+      <p:sp>
+        <p:nvSpPr>
+          <p:cNvPr id="6" name="文字方塊 5"/>
+          <p:cNvSpPr txBox="1"/>
+          <p:nvPr/>
+        </p:nvSpPr>
+        <p:spPr>
+          <a:xfrm>
+            <a:off x="642910" y="1285866"/>
+            <a:ext cx="642942" cy="830997"/>
+          </a:xfrm>
+          <a:prstGeom prst="rect">
+            <a:avLst/>
+          </a:prstGeom>
+          <a:noFill/>
+        </p:spPr>
+        <p:txBody>
+          <a:bodyPr wrap="square" rtlCol="0">
+            <a:spAutoFit/>
+          </a:bodyPr>
+          <a:lstStyle/>
+          <a:p>
+            <a:r>
+              <a:rPr lang="en-US" altLang="zh-TW" sz="4800" b="1" dirty="0" smtClean="0">
+                <a:solidFill>
+                  <a:srgbClr val="002060"/>
+                </a:solidFill>
+              </a:rPr>
+              <a:t>1.</a:t>
+            </a:r>
+            <a:endParaRPr lang="zh-TW" altLang="en-US" sz="4800" b="1" dirty="0">
+              <a:solidFill>
+                <a:srgbClr val="002060"/>
+              </a:solidFill>
+            </a:endParaRPr>
           </a:p>
         </p:txBody>
       </p:sp>
@@ -3292,6 +3330,13 @@
   <p:clrMapOvr>
     <a:masterClrMapping/>
   </p:clrMapOvr>
+  <p:timing>
+    <p:tnLst>
+      <p:par>
+        <p:cTn id="1" dur="indefinite" restart="never" nodeType="tmRoot"/>
+      </p:par>
+    </p:tnLst>
+  </p:timing>
 </p:sld>
 </file>
 
@@ -3366,7 +3411,7 @@
               <a:buNone/>
             </a:pPr>
             <a:r>
-              <a:rPr lang="zh-TW" altLang="en-US" sz="5000" b="1" dirty="0">
+              <a:rPr lang="zh-TW" altLang="en-US" sz="4800" b="1" dirty="0">
                 <a:solidFill>
                   <a:srgbClr val="002060"/>
                 </a:solidFill>
@@ -3376,7 +3421,7 @@
               <a:t>不住</a:t>
             </a:r>
             <a:r>
-              <a:rPr lang="zh-TW" altLang="en-US" sz="5000" b="1" dirty="0" smtClean="0">
+              <a:rPr lang="zh-TW" altLang="en-US" sz="4800" b="1" dirty="0" smtClean="0">
                 <a:solidFill>
                   <a:srgbClr val="002060"/>
                 </a:solidFill>
@@ -3386,7 +3431,7 @@
               <a:t>祈禱  </a:t>
             </a:r>
             <a:r>
-              <a:rPr lang="zh-TW" altLang="en-US" sz="5000" b="1" dirty="0">
+              <a:rPr lang="zh-TW" altLang="en-US" sz="4800" b="1" dirty="0">
                 <a:solidFill>
                   <a:srgbClr val="002060"/>
                 </a:solidFill>
@@ -3401,7 +3446,7 @@
               <a:buNone/>
             </a:pPr>
             <a:r>
-              <a:rPr lang="zh-TW" altLang="en-US" sz="5000" b="1" dirty="0">
+              <a:rPr lang="zh-TW" altLang="en-US" sz="4800" b="1" dirty="0">
                 <a:solidFill>
                   <a:srgbClr val="002060"/>
                 </a:solidFill>
@@ -3411,7 +3456,7 @@
               <a:t>不住</a:t>
             </a:r>
             <a:r>
-              <a:rPr lang="zh-TW" altLang="en-US" sz="5000" b="1" dirty="0" smtClean="0">
+              <a:rPr lang="zh-TW" altLang="en-US" sz="4800" b="1" dirty="0" smtClean="0">
                 <a:solidFill>
                   <a:srgbClr val="002060"/>
                 </a:solidFill>
@@ -3421,7 +3466,7 @@
               <a:t>祈禱  </a:t>
             </a:r>
             <a:r>
-              <a:rPr lang="zh-TW" altLang="en-US" sz="5000" b="1" dirty="0">
+              <a:rPr lang="zh-TW" altLang="en-US" sz="4800" b="1" dirty="0">
                 <a:solidFill>
                   <a:srgbClr val="002060"/>
                 </a:solidFill>
@@ -3431,7 +3476,7 @@
               <a:t>主賜全</a:t>
             </a:r>
             <a:r>
-              <a:rPr lang="zh-TW" altLang="en-US" sz="5000" b="1" dirty="0" smtClean="0">
+              <a:rPr lang="zh-TW" altLang="en-US" sz="4800" b="1" dirty="0" smtClean="0">
                 <a:solidFill>
                   <a:srgbClr val="002060"/>
                 </a:solidFill>
@@ -3440,7 +3485,7 @@
               </a:rPr>
               <a:t>備</a:t>
             </a:r>
-            <a:endParaRPr lang="en-US" altLang="zh-TW" sz="5000" b="1" dirty="0" smtClean="0">
+            <a:endParaRPr lang="en-US" altLang="zh-TW" sz="4800" b="1" dirty="0" smtClean="0">
               <a:solidFill>
                 <a:srgbClr val="002060"/>
               </a:solidFill>
@@ -3453,7 +3498,7 @@
               <a:buNone/>
             </a:pPr>
             <a:r>
-              <a:rPr lang="zh-TW" altLang="en-US" sz="5000" b="1" dirty="0" smtClean="0">
+              <a:rPr lang="zh-TW" altLang="en-US" sz="4800" b="1" dirty="0" smtClean="0">
                 <a:solidFill>
                   <a:srgbClr val="002060"/>
                 </a:solidFill>
@@ -3463,7 +3508,7 @@
               <a:t>無</a:t>
             </a:r>
             <a:r>
-              <a:rPr lang="zh-TW" altLang="en-US" sz="5000" b="1" dirty="0">
+              <a:rPr lang="zh-TW" altLang="en-US" sz="4800" b="1" dirty="0">
                 <a:solidFill>
                   <a:srgbClr val="002060"/>
                 </a:solidFill>
@@ -3473,7 +3518,7 @@
               <a:t>一禱詞 </a:t>
             </a:r>
             <a:r>
-              <a:rPr lang="zh-TW" altLang="en-US" sz="5000" b="1" dirty="0" smtClean="0">
+              <a:rPr lang="zh-TW" altLang="en-US" sz="4800" b="1" dirty="0" smtClean="0">
                 <a:solidFill>
                   <a:srgbClr val="002060"/>
                 </a:solidFill>
@@ -3483,7 +3528,7 @@
               <a:t> 主</a:t>
             </a:r>
             <a:r>
-              <a:rPr lang="zh-TW" altLang="en-US" sz="5000" b="1" dirty="0">
+              <a:rPr lang="zh-TW" altLang="en-US" sz="4800" b="1" dirty="0">
                 <a:solidFill>
                   <a:srgbClr val="002060"/>
                 </a:solidFill>
@@ -3498,7 +3543,7 @@
               <a:buNone/>
             </a:pPr>
             <a:r>
-              <a:rPr lang="zh-TW" altLang="en-US" sz="5000" b="1" dirty="0">
+              <a:rPr lang="zh-TW" altLang="en-US" sz="4800" b="1" dirty="0">
                 <a:solidFill>
                   <a:srgbClr val="002060"/>
                 </a:solidFill>
@@ -3508,7 +3553,7 @@
               <a:t>不住祈禱 </a:t>
             </a:r>
             <a:r>
-              <a:rPr lang="zh-TW" altLang="en-US" sz="5000" b="1" dirty="0" smtClean="0">
+              <a:rPr lang="zh-TW" altLang="en-US" sz="4800" b="1" dirty="0" smtClean="0">
                 <a:solidFill>
                   <a:srgbClr val="002060"/>
                 </a:solidFill>
@@ -3518,7 +3563,7 @@
               <a:t> 主</a:t>
             </a:r>
             <a:r>
-              <a:rPr lang="zh-TW" altLang="en-US" sz="5000" b="1" dirty="0">
+              <a:rPr lang="zh-TW" altLang="en-US" sz="4800" b="1" dirty="0">
                 <a:solidFill>
                   <a:srgbClr val="002060"/>
                 </a:solidFill>
@@ -3527,6 +3572,52 @@
               </a:rPr>
               <a:t>都明瞭</a:t>
             </a:r>
+          </a:p>
+        </p:txBody>
+      </p:sp>
+      <p:sp>
+        <p:nvSpPr>
+          <p:cNvPr id="6" name="文字方塊 5"/>
+          <p:cNvSpPr txBox="1"/>
+          <p:nvPr/>
+        </p:nvSpPr>
+        <p:spPr>
+          <a:xfrm>
+            <a:off x="642910" y="1285866"/>
+            <a:ext cx="642942" cy="830997"/>
+          </a:xfrm>
+          <a:prstGeom prst="rect">
+            <a:avLst/>
+          </a:prstGeom>
+          <a:noFill/>
+        </p:spPr>
+        <p:txBody>
+          <a:bodyPr wrap="square" rtlCol="0">
+            <a:spAutoFit/>
+          </a:bodyPr>
+          <a:lstStyle/>
+          <a:p>
+            <a:r>
+              <a:rPr lang="en-US" altLang="zh-TW" sz="4800" b="1" dirty="0" smtClean="0">
+                <a:solidFill>
+                  <a:srgbClr val="002060"/>
+                </a:solidFill>
+              </a:rPr>
+              <a:t>2</a:t>
+            </a:r>
+            <a:r>
+              <a:rPr lang="en-US" altLang="zh-TW" sz="4800" b="1" dirty="0" smtClean="0">
+                <a:solidFill>
+                  <a:srgbClr val="002060"/>
+                </a:solidFill>
+              </a:rPr>
+              <a:t>.</a:t>
+            </a:r>
+            <a:endParaRPr lang="zh-TW" altLang="en-US" sz="4800" b="1" dirty="0">
+              <a:solidFill>
+                <a:srgbClr val="002060"/>
+              </a:solidFill>
+            </a:endParaRPr>
           </a:p>
         </p:txBody>
       </p:sp>
@@ -3535,6 +3626,13 @@
   <p:clrMapOvr>
     <a:masterClrMapping/>
   </p:clrMapOvr>
+  <p:timing>
+    <p:tnLst>
+      <p:par>
+        <p:cTn id="1" dur="indefinite" restart="never" nodeType="tmRoot"/>
+      </p:par>
+    </p:tnLst>
+  </p:timing>
 </p:sld>
 </file>
 
@@ -3606,7 +3704,7 @@
               <a:buNone/>
             </a:pPr>
             <a:r>
-              <a:rPr lang="zh-TW" altLang="en-US" sz="5000" b="1" dirty="0">
+              <a:rPr lang="zh-TW" altLang="en-US" sz="4800" b="1" dirty="0">
                 <a:solidFill>
                   <a:srgbClr val="002060"/>
                 </a:solidFill>
@@ -3616,7 +3714,7 @@
               <a:t>不住</a:t>
             </a:r>
             <a:r>
-              <a:rPr lang="zh-TW" altLang="en-US" sz="5000" b="1" dirty="0" smtClean="0">
+              <a:rPr lang="zh-TW" altLang="en-US" sz="4800" b="1" dirty="0" smtClean="0">
                 <a:solidFill>
                   <a:srgbClr val="002060"/>
                 </a:solidFill>
@@ -3626,7 +3724,7 @@
               <a:t>祈禱  </a:t>
             </a:r>
             <a:r>
-              <a:rPr lang="zh-TW" altLang="en-US" sz="5000" b="1" dirty="0">
+              <a:rPr lang="zh-TW" altLang="en-US" sz="4800" b="1" dirty="0">
                 <a:solidFill>
                   <a:srgbClr val="002060"/>
                 </a:solidFill>
@@ -3641,7 +3739,7 @@
               <a:buNone/>
             </a:pPr>
             <a:r>
-              <a:rPr lang="zh-TW" altLang="en-US" sz="5000" b="1" dirty="0">
+              <a:rPr lang="zh-TW" altLang="en-US" sz="4800" b="1" dirty="0">
                 <a:solidFill>
                   <a:srgbClr val="002060"/>
                 </a:solidFill>
@@ -3651,7 +3749,7 @@
               <a:t>不住</a:t>
             </a:r>
             <a:r>
-              <a:rPr lang="zh-TW" altLang="en-US" sz="5000" b="1" dirty="0" smtClean="0">
+              <a:rPr lang="zh-TW" altLang="en-US" sz="4800" b="1" dirty="0" smtClean="0">
                 <a:solidFill>
                   <a:srgbClr val="002060"/>
                 </a:solidFill>
@@ -3661,7 +3759,7 @@
               <a:t>祈禱  </a:t>
             </a:r>
             <a:r>
-              <a:rPr lang="zh-TW" altLang="en-US" sz="5000" b="1" dirty="0">
+              <a:rPr lang="zh-TW" altLang="en-US" sz="4800" b="1" dirty="0">
                 <a:solidFill>
                   <a:srgbClr val="002060"/>
                 </a:solidFill>
@@ -3671,7 +3769,7 @@
               <a:t>必能</a:t>
             </a:r>
             <a:r>
-              <a:rPr lang="zh-TW" altLang="en-US" sz="5000" b="1" dirty="0" smtClean="0">
+              <a:rPr lang="zh-TW" altLang="en-US" sz="4800" b="1" dirty="0" smtClean="0">
                 <a:solidFill>
                   <a:srgbClr val="002060"/>
                 </a:solidFill>
@@ -3680,7 +3778,7 @@
               </a:rPr>
               <a:t>站住</a:t>
             </a:r>
-            <a:endParaRPr lang="en-US" altLang="zh-TW" sz="5000" b="1" dirty="0" smtClean="0">
+            <a:endParaRPr lang="en-US" altLang="zh-TW" sz="4800" b="1" dirty="0" smtClean="0">
               <a:solidFill>
                 <a:srgbClr val="002060"/>
               </a:solidFill>
@@ -3693,7 +3791,7 @@
               <a:buNone/>
             </a:pPr>
             <a:r>
-              <a:rPr lang="zh-TW" altLang="en-US" sz="5000" b="1" dirty="0" smtClean="0">
+              <a:rPr lang="zh-TW" altLang="en-US" sz="4800" b="1" dirty="0" smtClean="0">
                 <a:solidFill>
                   <a:srgbClr val="002060"/>
                 </a:solidFill>
@@ -3703,7 +3801,7 @@
               <a:t>主</a:t>
             </a:r>
             <a:r>
-              <a:rPr lang="zh-TW" altLang="en-US" sz="5000" b="1" dirty="0">
+              <a:rPr lang="zh-TW" altLang="en-US" sz="4800" b="1" dirty="0">
                 <a:solidFill>
                   <a:srgbClr val="002060"/>
                 </a:solidFill>
@@ -3713,7 +3811,7 @@
               <a:t>曾受</a:t>
             </a:r>
             <a:r>
-              <a:rPr lang="zh-TW" altLang="en-US" sz="5000" b="1" dirty="0" smtClean="0">
+              <a:rPr lang="zh-TW" altLang="en-US" sz="4800" b="1" dirty="0" smtClean="0">
                 <a:solidFill>
                   <a:srgbClr val="002060"/>
                 </a:solidFill>
@@ -3723,7 +3821,7 @@
               <a:t>試  </a:t>
             </a:r>
             <a:r>
-              <a:rPr lang="zh-TW" altLang="en-US" sz="5000" b="1" dirty="0">
+              <a:rPr lang="zh-TW" altLang="en-US" sz="4800" b="1" dirty="0">
                 <a:solidFill>
                   <a:srgbClr val="002060"/>
                 </a:solidFill>
@@ -3738,7 +3836,7 @@
               <a:buNone/>
             </a:pPr>
             <a:r>
-              <a:rPr lang="zh-TW" altLang="en-US" sz="5000" b="1" dirty="0">
+              <a:rPr lang="zh-TW" altLang="en-US" sz="4800" b="1" dirty="0">
                 <a:solidFill>
                   <a:srgbClr val="002060"/>
                 </a:solidFill>
@@ -3748,7 +3846,7 @@
               <a:t>不住</a:t>
             </a:r>
             <a:r>
-              <a:rPr lang="zh-TW" altLang="en-US" sz="5000" b="1" dirty="0" smtClean="0">
+              <a:rPr lang="zh-TW" altLang="en-US" sz="4800" b="1" dirty="0" smtClean="0">
                 <a:solidFill>
                   <a:srgbClr val="002060"/>
                 </a:solidFill>
@@ -3758,7 +3856,7 @@
               <a:t>祈禱  </a:t>
             </a:r>
             <a:r>
-              <a:rPr lang="zh-TW" altLang="en-US" sz="5000" b="1" dirty="0">
+              <a:rPr lang="zh-TW" altLang="en-US" sz="4800" b="1" dirty="0">
                 <a:solidFill>
                   <a:srgbClr val="002060"/>
                 </a:solidFill>
@@ -3767,6 +3865,52 @@
               </a:rPr>
               <a:t>主攙扶你</a:t>
             </a:r>
+          </a:p>
+        </p:txBody>
+      </p:sp>
+      <p:sp>
+        <p:nvSpPr>
+          <p:cNvPr id="6" name="文字方塊 5"/>
+          <p:cNvSpPr txBox="1"/>
+          <p:nvPr/>
+        </p:nvSpPr>
+        <p:spPr>
+          <a:xfrm>
+            <a:off x="642910" y="1285866"/>
+            <a:ext cx="642942" cy="830997"/>
+          </a:xfrm>
+          <a:prstGeom prst="rect">
+            <a:avLst/>
+          </a:prstGeom>
+          <a:noFill/>
+        </p:spPr>
+        <p:txBody>
+          <a:bodyPr wrap="square" rtlCol="0">
+            <a:spAutoFit/>
+          </a:bodyPr>
+          <a:lstStyle/>
+          <a:p>
+            <a:r>
+              <a:rPr lang="en-US" altLang="zh-TW" sz="4800" b="1" dirty="0" smtClean="0">
+                <a:solidFill>
+                  <a:srgbClr val="002060"/>
+                </a:solidFill>
+              </a:rPr>
+              <a:t>3</a:t>
+            </a:r>
+            <a:r>
+              <a:rPr lang="en-US" altLang="zh-TW" sz="4800" b="1" dirty="0" smtClean="0">
+                <a:solidFill>
+                  <a:srgbClr val="002060"/>
+                </a:solidFill>
+              </a:rPr>
+              <a:t>.</a:t>
+            </a:r>
+            <a:endParaRPr lang="zh-TW" altLang="en-US" sz="4800" b="1" dirty="0">
+              <a:solidFill>
+                <a:srgbClr val="002060"/>
+              </a:solidFill>
+            </a:endParaRPr>
           </a:p>
         </p:txBody>
       </p:sp>
@@ -3775,6 +3919,13 @@
   <p:clrMapOvr>
     <a:masterClrMapping/>
   </p:clrMapOvr>
+  <p:timing>
+    <p:tnLst>
+      <p:par>
+        <p:cTn id="1" dur="indefinite" restart="never" nodeType="tmRoot"/>
+      </p:par>
+    </p:tnLst>
+  </p:timing>
 </p:sld>
 </file>
 
@@ -3846,7 +3997,7 @@
               <a:buNone/>
             </a:pPr>
             <a:r>
-              <a:rPr lang="zh-TW" altLang="en-US" sz="5000" b="1" dirty="0">
+              <a:rPr lang="zh-TW" altLang="en-US" sz="4800" b="1" dirty="0">
                 <a:solidFill>
                   <a:srgbClr val="002060"/>
                 </a:solidFill>
@@ -3856,7 +4007,7 @@
               <a:t>不住</a:t>
             </a:r>
             <a:r>
-              <a:rPr lang="zh-TW" altLang="en-US" sz="5000" b="1" dirty="0" smtClean="0">
+              <a:rPr lang="zh-TW" altLang="en-US" sz="4800" b="1" dirty="0" smtClean="0">
                 <a:solidFill>
                   <a:srgbClr val="002060"/>
                 </a:solidFill>
@@ -3866,7 +4017,7 @@
               <a:t>祈禱  </a:t>
             </a:r>
             <a:r>
-              <a:rPr lang="zh-TW" altLang="en-US" sz="5000" b="1" dirty="0">
+              <a:rPr lang="zh-TW" altLang="en-US" sz="4800" b="1" dirty="0">
                 <a:solidFill>
                   <a:srgbClr val="002060"/>
                 </a:solidFill>
@@ -3881,7 +4032,7 @@
               <a:buNone/>
             </a:pPr>
             <a:r>
-              <a:rPr lang="zh-TW" altLang="en-US" sz="5000" b="1" dirty="0">
+              <a:rPr lang="zh-TW" altLang="en-US" sz="4800" b="1" dirty="0">
                 <a:solidFill>
                   <a:srgbClr val="002060"/>
                 </a:solidFill>
@@ -3891,7 +4042,7 @@
               <a:t>不住祈禱 </a:t>
             </a:r>
             <a:r>
-              <a:rPr lang="zh-TW" altLang="en-US" sz="5000" b="1" dirty="0" smtClean="0">
+              <a:rPr lang="zh-TW" altLang="en-US" sz="4800" b="1" dirty="0" smtClean="0">
                 <a:solidFill>
                   <a:srgbClr val="002060"/>
                 </a:solidFill>
@@ -3901,7 +4052,7 @@
               <a:t> 必</a:t>
             </a:r>
             <a:r>
-              <a:rPr lang="zh-TW" altLang="en-US" sz="5000" b="1" dirty="0">
+              <a:rPr lang="zh-TW" altLang="en-US" sz="4800" b="1" dirty="0">
                 <a:solidFill>
                   <a:srgbClr val="002060"/>
                 </a:solidFill>
@@ -3911,7 +4062,7 @@
               <a:t>能</a:t>
             </a:r>
             <a:r>
-              <a:rPr lang="zh-TW" altLang="en-US" sz="5000" b="1" dirty="0" smtClean="0">
+              <a:rPr lang="zh-TW" altLang="en-US" sz="4800" b="1" dirty="0" smtClean="0">
                 <a:solidFill>
                   <a:srgbClr val="002060"/>
                 </a:solidFill>
@@ -3920,7 +4071,7 @@
               </a:rPr>
               <a:t>拯救</a:t>
             </a:r>
-            <a:endParaRPr lang="en-US" altLang="zh-TW" sz="5000" b="1" dirty="0" smtClean="0">
+            <a:endParaRPr lang="en-US" altLang="zh-TW" sz="4800" b="1" dirty="0" smtClean="0">
               <a:solidFill>
                 <a:srgbClr val="002060"/>
               </a:solidFill>
@@ -3933,7 +4084,7 @@
               <a:buNone/>
             </a:pPr>
             <a:r>
-              <a:rPr lang="zh-TW" altLang="en-US" sz="5000" b="1" dirty="0" smtClean="0">
+              <a:rPr lang="zh-TW" altLang="en-US" sz="4800" b="1" dirty="0" smtClean="0">
                 <a:solidFill>
                   <a:srgbClr val="002060"/>
                 </a:solidFill>
@@ -3943,7 +4094,7 @@
               <a:t>你</a:t>
             </a:r>
             <a:r>
-              <a:rPr lang="zh-TW" altLang="en-US" sz="5000" b="1" dirty="0">
+              <a:rPr lang="zh-TW" altLang="en-US" sz="4800" b="1" dirty="0">
                 <a:solidFill>
                   <a:srgbClr val="002060"/>
                 </a:solidFill>
@@ -3953,7 +4104,7 @@
               <a:t>心苦楚 </a:t>
             </a:r>
             <a:r>
-              <a:rPr lang="zh-TW" altLang="en-US" sz="5000" b="1" dirty="0" smtClean="0">
+              <a:rPr lang="zh-TW" altLang="en-US" sz="4800" b="1" dirty="0" smtClean="0">
                 <a:solidFill>
                   <a:srgbClr val="002060"/>
                 </a:solidFill>
@@ -3963,7 +4114,7 @@
               <a:t> 真神</a:t>
             </a:r>
             <a:r>
-              <a:rPr lang="zh-TW" altLang="en-US" sz="5000" b="1" dirty="0">
+              <a:rPr lang="zh-TW" altLang="en-US" sz="4800" b="1" dirty="0">
                 <a:solidFill>
                   <a:srgbClr val="002060"/>
                 </a:solidFill>
@@ -3978,7 +4129,7 @@
               <a:buNone/>
             </a:pPr>
             <a:r>
-              <a:rPr lang="zh-TW" altLang="en-US" sz="5000" b="1" dirty="0">
+              <a:rPr lang="zh-TW" altLang="en-US" sz="4800" b="1" dirty="0">
                 <a:solidFill>
                   <a:srgbClr val="002060"/>
                 </a:solidFill>
@@ -3988,7 +4139,7 @@
               <a:t>不住祈禱 </a:t>
             </a:r>
             <a:r>
-              <a:rPr lang="zh-TW" altLang="en-US" sz="5000" b="1" dirty="0" smtClean="0">
+              <a:rPr lang="zh-TW" altLang="en-US" sz="4800" b="1" dirty="0" smtClean="0">
                 <a:solidFill>
                   <a:srgbClr val="002060"/>
                 </a:solidFill>
@@ -3998,7 +4149,7 @@
               <a:t> 主</a:t>
             </a:r>
             <a:r>
-              <a:rPr lang="zh-TW" altLang="en-US" sz="5000" b="1" dirty="0">
+              <a:rPr lang="zh-TW" altLang="en-US" sz="4800" b="1" dirty="0">
                 <a:solidFill>
                   <a:srgbClr val="002060"/>
                 </a:solidFill>
@@ -4007,6 +4158,52 @@
               </a:rPr>
               <a:t>會排好</a:t>
             </a:r>
+          </a:p>
+        </p:txBody>
+      </p:sp>
+      <p:sp>
+        <p:nvSpPr>
+          <p:cNvPr id="6" name="文字方塊 5"/>
+          <p:cNvSpPr txBox="1"/>
+          <p:nvPr/>
+        </p:nvSpPr>
+        <p:spPr>
+          <a:xfrm>
+            <a:off x="642910" y="1285866"/>
+            <a:ext cx="642942" cy="830997"/>
+          </a:xfrm>
+          <a:prstGeom prst="rect">
+            <a:avLst/>
+          </a:prstGeom>
+          <a:noFill/>
+        </p:spPr>
+        <p:txBody>
+          <a:bodyPr wrap="square" rtlCol="0">
+            <a:spAutoFit/>
+          </a:bodyPr>
+          <a:lstStyle/>
+          <a:p>
+            <a:r>
+              <a:rPr lang="en-US" altLang="zh-TW" sz="4800" b="1" dirty="0" smtClean="0">
+                <a:solidFill>
+                  <a:srgbClr val="002060"/>
+                </a:solidFill>
+              </a:rPr>
+              <a:t>4</a:t>
+            </a:r>
+            <a:r>
+              <a:rPr lang="en-US" altLang="zh-TW" sz="4800" b="1" dirty="0" smtClean="0">
+                <a:solidFill>
+                  <a:srgbClr val="002060"/>
+                </a:solidFill>
+              </a:rPr>
+              <a:t>.</a:t>
+            </a:r>
+            <a:endParaRPr lang="zh-TW" altLang="en-US" sz="4800" b="1" dirty="0">
+              <a:solidFill>
+                <a:srgbClr val="002060"/>
+              </a:solidFill>
+            </a:endParaRPr>
           </a:p>
         </p:txBody>
       </p:sp>
@@ -4015,6 +4212,13 @@
   <p:clrMapOvr>
     <a:masterClrMapping/>
   </p:clrMapOvr>
+  <p:timing>
+    <p:tnLst>
+      <p:par>
+        <p:cTn id="1" dur="indefinite" restart="never" nodeType="tmRoot"/>
+      </p:par>
+    </p:tnLst>
+  </p:timing>
 </p:sld>
 </file>
 
@@ -4091,7 +4295,7 @@
               <a:buNone/>
             </a:pPr>
             <a:r>
-              <a:rPr lang="zh-TW" altLang="en-US" sz="5000" b="1" dirty="0">
+              <a:rPr lang="zh-TW" altLang="en-US" sz="4800" b="1" dirty="0">
                 <a:solidFill>
                   <a:srgbClr val="002060"/>
                 </a:solidFill>
@@ -4101,7 +4305,7 @@
               <a:t>不住祈禱 </a:t>
             </a:r>
             <a:r>
-              <a:rPr lang="zh-TW" altLang="en-US" sz="5000" b="1" dirty="0" smtClean="0">
+              <a:rPr lang="zh-TW" altLang="en-US" sz="4800" b="1" dirty="0" smtClean="0">
                 <a:solidFill>
                   <a:srgbClr val="002060"/>
                 </a:solidFill>
@@ -4111,7 +4315,7 @@
               <a:t> 當</a:t>
             </a:r>
             <a:r>
-              <a:rPr lang="zh-TW" altLang="en-US" sz="5000" b="1" dirty="0">
+              <a:rPr lang="zh-TW" altLang="en-US" sz="4800" b="1" dirty="0">
                 <a:solidFill>
                   <a:srgbClr val="002060"/>
                 </a:solidFill>
@@ -4126,7 +4330,7 @@
               <a:buNone/>
             </a:pPr>
             <a:r>
-              <a:rPr lang="zh-TW" altLang="en-US" sz="5000" b="1" dirty="0">
+              <a:rPr lang="zh-TW" altLang="en-US" sz="4800" b="1" dirty="0">
                 <a:solidFill>
                   <a:srgbClr val="002060"/>
                 </a:solidFill>
@@ -4136,7 +4340,7 @@
               <a:t>不住祈禱 </a:t>
             </a:r>
             <a:r>
-              <a:rPr lang="zh-TW" altLang="en-US" sz="5000" b="1" dirty="0" smtClean="0">
+              <a:rPr lang="zh-TW" altLang="en-US" sz="4800" b="1" dirty="0" smtClean="0">
                 <a:solidFill>
                   <a:srgbClr val="002060"/>
                 </a:solidFill>
@@ -4146,7 +4350,7 @@
               <a:t> 是</a:t>
             </a:r>
             <a:r>
-              <a:rPr lang="zh-TW" altLang="en-US" sz="5000" b="1" dirty="0">
+              <a:rPr lang="zh-TW" altLang="en-US" sz="4800" b="1" dirty="0">
                 <a:solidFill>
                   <a:srgbClr val="002060"/>
                 </a:solidFill>
@@ -4156,7 +4360,7 @@
               <a:t>最</a:t>
             </a:r>
             <a:r>
-              <a:rPr lang="zh-TW" altLang="en-US" sz="5000" b="1" dirty="0" smtClean="0">
+              <a:rPr lang="zh-TW" altLang="en-US" sz="4800" b="1" dirty="0" smtClean="0">
                 <a:solidFill>
                   <a:srgbClr val="002060"/>
                 </a:solidFill>
@@ -4165,7 +4369,7 @@
               </a:rPr>
               <a:t>要緊</a:t>
             </a:r>
-            <a:endParaRPr lang="en-US" altLang="zh-TW" sz="5000" b="1" dirty="0" smtClean="0">
+            <a:endParaRPr lang="en-US" altLang="zh-TW" sz="4800" b="1" dirty="0" smtClean="0">
               <a:solidFill>
                 <a:srgbClr val="002060"/>
               </a:solidFill>
@@ -4178,7 +4382,7 @@
               <a:buNone/>
             </a:pPr>
             <a:r>
-              <a:rPr lang="zh-TW" altLang="en-US" sz="5000" b="1" dirty="0" smtClean="0">
+              <a:rPr lang="zh-TW" altLang="en-US" sz="4800" b="1" dirty="0" smtClean="0">
                 <a:solidFill>
                   <a:srgbClr val="002060"/>
                 </a:solidFill>
@@ -4188,7 +4392,7 @@
               <a:t>信心</a:t>
             </a:r>
             <a:r>
-              <a:rPr lang="zh-TW" altLang="en-US" sz="5000" b="1" dirty="0">
+              <a:rPr lang="zh-TW" altLang="en-US" sz="4800" b="1" dirty="0">
                 <a:solidFill>
                   <a:srgbClr val="002060"/>
                 </a:solidFill>
@@ -4198,7 +4402,7 @@
               <a:t>能除 </a:t>
             </a:r>
             <a:r>
-              <a:rPr lang="zh-TW" altLang="en-US" sz="5000" b="1" dirty="0" smtClean="0">
+              <a:rPr lang="zh-TW" altLang="en-US" sz="4800" b="1" dirty="0" smtClean="0">
                 <a:solidFill>
                   <a:srgbClr val="002060"/>
                 </a:solidFill>
@@ -4208,7 +4412,7 @@
               <a:t> 憂愁</a:t>
             </a:r>
             <a:r>
-              <a:rPr lang="zh-TW" altLang="en-US" sz="5000" b="1" dirty="0">
+              <a:rPr lang="zh-TW" altLang="en-US" sz="4800" b="1" dirty="0">
                 <a:solidFill>
                   <a:srgbClr val="002060"/>
                 </a:solidFill>
@@ -4223,7 +4427,7 @@
               <a:buNone/>
             </a:pPr>
             <a:r>
-              <a:rPr lang="zh-TW" altLang="en-US" sz="5000" b="1">
+              <a:rPr lang="zh-TW" altLang="en-US" sz="4800" b="1" dirty="0">
                 <a:solidFill>
                   <a:srgbClr val="002060"/>
                 </a:solidFill>
@@ -4233,7 +4437,7 @@
               <a:t>不住</a:t>
             </a:r>
             <a:r>
-              <a:rPr lang="zh-TW" altLang="en-US" sz="5000" b="1" smtClean="0">
+              <a:rPr lang="zh-TW" altLang="en-US" sz="4800" b="1" dirty="0" smtClean="0">
                 <a:solidFill>
                   <a:srgbClr val="002060"/>
                 </a:solidFill>
@@ -4243,7 +4447,7 @@
               <a:t>祈禱  </a:t>
             </a:r>
             <a:r>
-              <a:rPr lang="zh-TW" altLang="en-US" sz="5000" b="1" dirty="0">
+              <a:rPr lang="zh-TW" altLang="en-US" sz="4800" b="1" dirty="0">
                 <a:solidFill>
                   <a:srgbClr val="002060"/>
                 </a:solidFill>
@@ -4252,6 +4456,52 @@
               </a:rPr>
               <a:t>主必答應</a:t>
             </a:r>
+          </a:p>
+        </p:txBody>
+      </p:sp>
+      <p:sp>
+        <p:nvSpPr>
+          <p:cNvPr id="6" name="文字方塊 5"/>
+          <p:cNvSpPr txBox="1"/>
+          <p:nvPr/>
+        </p:nvSpPr>
+        <p:spPr>
+          <a:xfrm>
+            <a:off x="642910" y="1285866"/>
+            <a:ext cx="642942" cy="830997"/>
+          </a:xfrm>
+          <a:prstGeom prst="rect">
+            <a:avLst/>
+          </a:prstGeom>
+          <a:noFill/>
+        </p:spPr>
+        <p:txBody>
+          <a:bodyPr wrap="square" rtlCol="0">
+            <a:spAutoFit/>
+          </a:bodyPr>
+          <a:lstStyle/>
+          <a:p>
+            <a:r>
+              <a:rPr lang="en-US" altLang="zh-TW" sz="4800" b="1" dirty="0" smtClean="0">
+                <a:solidFill>
+                  <a:srgbClr val="002060"/>
+                </a:solidFill>
+              </a:rPr>
+              <a:t>5</a:t>
+            </a:r>
+            <a:r>
+              <a:rPr lang="en-US" altLang="zh-TW" sz="4800" b="1" dirty="0" smtClean="0">
+                <a:solidFill>
+                  <a:srgbClr val="002060"/>
+                </a:solidFill>
+              </a:rPr>
+              <a:t>.</a:t>
+            </a:r>
+            <a:endParaRPr lang="zh-TW" altLang="en-US" sz="4800" b="1" dirty="0">
+              <a:solidFill>
+                <a:srgbClr val="002060"/>
+              </a:solidFill>
+            </a:endParaRPr>
           </a:p>
         </p:txBody>
       </p:sp>
@@ -4260,6 +4510,13 @@
   <p:clrMapOvr>
     <a:masterClrMapping/>
   </p:clrMapOvr>
+  <p:timing>
+    <p:tnLst>
+      <p:par>
+        <p:cTn id="1" dur="indefinite" restart="never" nodeType="tmRoot"/>
+      </p:par>
+    </p:tnLst>
+  </p:timing>
 </p:sld>
 </file>
 

</xml_diff>